<commit_message>
Add Week 4 Result .pdf
</commit_message>
<xml_diff>
--- a/week2/[모각프]2회차_박정필.pptx
+++ b/week2/[모각프]2회차_박정필.pptx
@@ -277,7 +277,7 @@
           <a:p>
             <a:fld id="{3F8A50C2-589C-42C8-B763-56D87D9D16BD}" type="datetimeFigureOut">
               <a:rPr lang="ko-KR" altLang="en-US" smtClean="0"/>
-              <a:t>2021-07-30</a:t>
+              <a:t>2021-08-06</a:t>
             </a:fld>
             <a:endParaRPr lang="ko-KR" altLang="en-US"/>
           </a:p>
@@ -565,7 +565,7 @@
           <a:p>
             <a:fld id="{3F8A50C2-589C-42C8-B763-56D87D9D16BD}" type="datetimeFigureOut">
               <a:rPr lang="ko-KR" altLang="en-US" smtClean="0"/>
-              <a:t>2021-07-30</a:t>
+              <a:t>2021-08-06</a:t>
             </a:fld>
             <a:endParaRPr lang="ko-KR" altLang="en-US"/>
           </a:p>
@@ -763,7 +763,7 @@
           <a:p>
             <a:fld id="{3F8A50C2-589C-42C8-B763-56D87D9D16BD}" type="datetimeFigureOut">
               <a:rPr lang="ko-KR" altLang="en-US" smtClean="0"/>
-              <a:t>2021-07-30</a:t>
+              <a:t>2021-08-06</a:t>
             </a:fld>
             <a:endParaRPr lang="ko-KR" altLang="en-US"/>
           </a:p>
@@ -971,7 +971,7 @@
           <a:p>
             <a:fld id="{3F8A50C2-589C-42C8-B763-56D87D9D16BD}" type="datetimeFigureOut">
               <a:rPr lang="ko-KR" altLang="en-US" smtClean="0"/>
-              <a:t>2021-07-30</a:t>
+              <a:t>2021-08-06</a:t>
             </a:fld>
             <a:endParaRPr lang="ko-KR" altLang="en-US"/>
           </a:p>
@@ -1169,7 +1169,7 @@
           <a:p>
             <a:fld id="{3F8A50C2-589C-42C8-B763-56D87D9D16BD}" type="datetimeFigureOut">
               <a:rPr lang="ko-KR" altLang="en-US" smtClean="0"/>
-              <a:t>2021-07-30</a:t>
+              <a:t>2021-08-06</a:t>
             </a:fld>
             <a:endParaRPr lang="ko-KR" altLang="en-US"/>
           </a:p>
@@ -1444,7 +1444,7 @@
           <a:p>
             <a:fld id="{3F8A50C2-589C-42C8-B763-56D87D9D16BD}" type="datetimeFigureOut">
               <a:rPr lang="ko-KR" altLang="en-US" smtClean="0"/>
-              <a:t>2021-07-30</a:t>
+              <a:t>2021-08-06</a:t>
             </a:fld>
             <a:endParaRPr lang="ko-KR" altLang="en-US"/>
           </a:p>
@@ -1709,7 +1709,7 @@
           <a:p>
             <a:fld id="{3F8A50C2-589C-42C8-B763-56D87D9D16BD}" type="datetimeFigureOut">
               <a:rPr lang="ko-KR" altLang="en-US" smtClean="0"/>
-              <a:t>2021-07-30</a:t>
+              <a:t>2021-08-06</a:t>
             </a:fld>
             <a:endParaRPr lang="ko-KR" altLang="en-US"/>
           </a:p>
@@ -2121,7 +2121,7 @@
           <a:p>
             <a:fld id="{3F8A50C2-589C-42C8-B763-56D87D9D16BD}" type="datetimeFigureOut">
               <a:rPr lang="ko-KR" altLang="en-US" smtClean="0"/>
-              <a:t>2021-07-30</a:t>
+              <a:t>2021-08-06</a:t>
             </a:fld>
             <a:endParaRPr lang="ko-KR" altLang="en-US"/>
           </a:p>
@@ -2262,7 +2262,7 @@
           <a:p>
             <a:fld id="{3F8A50C2-589C-42C8-B763-56D87D9D16BD}" type="datetimeFigureOut">
               <a:rPr lang="ko-KR" altLang="en-US" smtClean="0"/>
-              <a:t>2021-07-30</a:t>
+              <a:t>2021-08-06</a:t>
             </a:fld>
             <a:endParaRPr lang="ko-KR" altLang="en-US"/>
           </a:p>
@@ -2375,7 +2375,7 @@
           <a:p>
             <a:fld id="{3F8A50C2-589C-42C8-B763-56D87D9D16BD}" type="datetimeFigureOut">
               <a:rPr lang="ko-KR" altLang="en-US" smtClean="0"/>
-              <a:t>2021-07-30</a:t>
+              <a:t>2021-08-06</a:t>
             </a:fld>
             <a:endParaRPr lang="ko-KR" altLang="en-US"/>
           </a:p>
@@ -2635,7 +2635,7 @@
           <a:p>
             <a:fld id="{3F8A50C2-589C-42C8-B763-56D87D9D16BD}" type="datetimeFigureOut">
               <a:rPr lang="ko-KR" altLang="en-US" smtClean="0"/>
-              <a:t>2021-07-30</a:t>
+              <a:t>2021-08-06</a:t>
             </a:fld>
             <a:endParaRPr lang="ko-KR" altLang="en-US"/>
           </a:p>
@@ -2946,7 +2946,7 @@
           <a:p>
             <a:fld id="{3F8A50C2-589C-42C8-B763-56D87D9D16BD}" type="datetimeFigureOut">
               <a:rPr lang="ko-KR" altLang="en-US" smtClean="0"/>
-              <a:t>2021-07-30</a:t>
+              <a:t>2021-08-06</a:t>
             </a:fld>
             <a:endParaRPr lang="ko-KR" altLang="en-US"/>
           </a:p>
@@ -3187,7 +3187,7 @@
           <a:p>
             <a:fld id="{3F8A50C2-589C-42C8-B763-56D87D9D16BD}" type="datetimeFigureOut">
               <a:rPr lang="ko-KR" altLang="en-US" smtClean="0"/>
-              <a:t>2021-07-30</a:t>
+              <a:t>2021-08-06</a:t>
             </a:fld>
             <a:endParaRPr lang="ko-KR" altLang="en-US"/>
           </a:p>
@@ -3829,7 +3829,7 @@
     <a:masterClrMapping/>
   </p:clrMapOvr>
   <mc:AlternateContent xmlns:mc="http://schemas.openxmlformats.org/markup-compatibility/2006">
-    <mc:Choice xmlns:p159="http://schemas.microsoft.com/office/powerpoint/2015/09/main" xmlns="" Requires="p159">
+    <mc:Choice xmlns="" xmlns:p159="http://schemas.microsoft.com/office/powerpoint/2015/09/main" Requires="p159">
       <p:transition xmlns:p14="http://schemas.microsoft.com/office/powerpoint/2010/main" spd="slow" p14:dur="2000">
         <p159:morph option="byObject"/>
       </p:transition>
@@ -4293,7 +4293,7 @@
     <a:masterClrMapping/>
   </p:clrMapOvr>
   <mc:AlternateContent xmlns:mc="http://schemas.openxmlformats.org/markup-compatibility/2006">
-    <mc:Choice xmlns:p159="http://schemas.microsoft.com/office/powerpoint/2015/09/main" xmlns="" Requires="p159">
+    <mc:Choice xmlns="" xmlns:p159="http://schemas.microsoft.com/office/powerpoint/2015/09/main" Requires="p159">
       <p:transition xmlns:p14="http://schemas.microsoft.com/office/powerpoint/2010/main" spd="slow" p14:dur="2000">
         <p159:morph option="byObject"/>
       </p:transition>
@@ -4547,7 +4547,7 @@
     <a:masterClrMapping/>
   </p:clrMapOvr>
   <mc:AlternateContent xmlns:mc="http://schemas.openxmlformats.org/markup-compatibility/2006">
-    <mc:Choice xmlns:p159="http://schemas.microsoft.com/office/powerpoint/2015/09/main" xmlns="" Requires="p159">
+    <mc:Choice xmlns="" xmlns:p159="http://schemas.microsoft.com/office/powerpoint/2015/09/main" Requires="p159">
       <p:transition xmlns:p14="http://schemas.microsoft.com/office/powerpoint/2010/main" spd="slow" p14:dur="2000">
         <p159:morph option="byObject"/>
       </p:transition>
@@ -4817,7 +4817,7 @@
     <a:masterClrMapping/>
   </p:clrMapOvr>
   <mc:AlternateContent xmlns:mc="http://schemas.openxmlformats.org/markup-compatibility/2006">
-    <mc:Choice xmlns:p159="http://schemas.microsoft.com/office/powerpoint/2015/09/main" xmlns="" Requires="p159">
+    <mc:Choice xmlns="" xmlns:p159="http://schemas.microsoft.com/office/powerpoint/2015/09/main" Requires="p159">
       <p:transition xmlns:p14="http://schemas.microsoft.com/office/powerpoint/2010/main" spd="slow" p14:dur="2000">
         <p159:morph option="byObject"/>
       </p:transition>
@@ -5061,7 +5061,7 @@
     <a:masterClrMapping/>
   </p:clrMapOvr>
   <mc:AlternateContent xmlns:mc="http://schemas.openxmlformats.org/markup-compatibility/2006">
-    <mc:Choice xmlns:p159="http://schemas.microsoft.com/office/powerpoint/2015/09/main" xmlns="" Requires="p159">
+    <mc:Choice xmlns="" xmlns:p159="http://schemas.microsoft.com/office/powerpoint/2015/09/main" Requires="p159">
       <p:transition xmlns:p14="http://schemas.microsoft.com/office/powerpoint/2010/main" spd="slow" p14:dur="2000">
         <p159:morph option="byObject"/>
       </p:transition>
@@ -5403,7 +5403,7 @@
     <a:masterClrMapping/>
   </p:clrMapOvr>
   <mc:AlternateContent xmlns:mc="http://schemas.openxmlformats.org/markup-compatibility/2006">
-    <mc:Choice xmlns:p159="http://schemas.microsoft.com/office/powerpoint/2015/09/main" xmlns="" Requires="p159">
+    <mc:Choice xmlns="" xmlns:p159="http://schemas.microsoft.com/office/powerpoint/2015/09/main" Requires="p159">
       <p:transition xmlns:p14="http://schemas.microsoft.com/office/powerpoint/2010/main" spd="slow" p14:dur="2000">
         <p159:morph option="byObject"/>
       </p:transition>
@@ -5745,7 +5745,7 @@
     <a:masterClrMapping/>
   </p:clrMapOvr>
   <mc:AlternateContent xmlns:mc="http://schemas.openxmlformats.org/markup-compatibility/2006">
-    <mc:Choice xmlns:p159="http://schemas.microsoft.com/office/powerpoint/2015/09/main" xmlns="" Requires="p159">
+    <mc:Choice xmlns="" xmlns:p159="http://schemas.microsoft.com/office/powerpoint/2015/09/main" Requires="p159">
       <p:transition xmlns:p14="http://schemas.microsoft.com/office/powerpoint/2010/main" spd="slow" p14:dur="2000">
         <p159:morph option="byObject"/>
       </p:transition>
@@ -5929,7 +5929,7 @@
     <a:masterClrMapping/>
   </p:clrMapOvr>
   <mc:AlternateContent xmlns:mc="http://schemas.openxmlformats.org/markup-compatibility/2006">
-    <mc:Choice xmlns:p159="http://schemas.microsoft.com/office/powerpoint/2015/09/main" xmlns="" Requires="p159">
+    <mc:Choice xmlns="" xmlns:p159="http://schemas.microsoft.com/office/powerpoint/2015/09/main" Requires="p159">
       <p:transition xmlns:p14="http://schemas.microsoft.com/office/powerpoint/2010/main" spd="slow" p14:dur="2000">
         <p159:morph option="byObject"/>
       </p:transition>

</xml_diff>